<commit_message>
Updated contents of the Jest Presentation powerpoint.
</commit_message>
<xml_diff>
--- a/Jest_Presentation.pptx
+++ b/Jest_Presentation.pptx
@@ -5,7 +5,7 @@
     <p:sldMasterId id="2147483658" r:id="rId4"/>
   </p:sldMasterIdLst>
   <p:notesMasterIdLst>
-    <p:notesMasterId r:id="rId29"/>
+    <p:notesMasterId r:id="rId30"/>
   </p:notesMasterIdLst>
   <p:sldIdLst>
     <p:sldId id="316" r:id="rId5"/>
@@ -31,29 +31,30 @@
     <p:sldId id="305" r:id="rId25"/>
     <p:sldId id="280" r:id="rId26"/>
     <p:sldId id="312" r:id="rId27"/>
-    <p:sldId id="281" r:id="rId28"/>
+    <p:sldId id="327" r:id="rId28"/>
+    <p:sldId id="281" r:id="rId29"/>
   </p:sldIdLst>
   <p:sldSz cx="9144000" cy="5143500" type="screen16x9"/>
   <p:notesSz cx="6858000" cy="9144000"/>
   <p:embeddedFontLst>
     <p:embeddedFont>
       <p:font typeface="Calibri" panose="020F0502020204030204" pitchFamily="34" charset="0"/>
-      <p:regular r:id="rId30"/>
-      <p:bold r:id="rId31"/>
-      <p:italic r:id="rId32"/>
-      <p:boldItalic r:id="rId33"/>
+      <p:regular r:id="rId31"/>
+      <p:bold r:id="rId32"/>
+      <p:italic r:id="rId33"/>
+      <p:boldItalic r:id="rId34"/>
     </p:embeddedFont>
     <p:embeddedFont>
       <p:font typeface="Roboto Slab" panose="020B0604020202020204" charset="0"/>
-      <p:regular r:id="rId34"/>
-      <p:bold r:id="rId35"/>
+      <p:regular r:id="rId35"/>
+      <p:bold r:id="rId36"/>
     </p:embeddedFont>
     <p:embeddedFont>
       <p:font typeface="Source Sans Pro" panose="020B0604020202020204" charset="0"/>
-      <p:regular r:id="rId36"/>
-      <p:bold r:id="rId37"/>
-      <p:italic r:id="rId38"/>
-      <p:boldItalic r:id="rId39"/>
+      <p:regular r:id="rId37"/>
+      <p:bold r:id="rId38"/>
+      <p:italic r:id="rId39"/>
+      <p:boldItalic r:id="rId40"/>
     </p:embeddedFont>
   </p:embeddedFontLst>
   <p:defaultTextStyle>
@@ -305,10 +306,12 @@
     <p1510:client id="{300D3252-84E7-4CDB-A28A-965B2ED0F814}" v="66" dt="2022-02-09T18:35:27.285"/>
     <p1510:client id="{31F7A3E4-A0D3-4EB7-9937-8089BC49881F}" v="40" dt="2022-02-12T19:19:52.599"/>
     <p1510:client id="{43AAFB38-4E3E-45F3-A573-B6A69FFE0D0E}" v="5" dt="2022-01-24T16:26:20.699"/>
+    <p1510:client id="{4E4DB25D-C161-446B-B49C-F5AC1F1B7C68}" v="61" dt="2022-02-12T19:52:06.039"/>
     <p1510:client id="{52616411-F528-42FE-A4E3-1D395244E643}" v="165" dt="2022-02-07T01:16:53.617"/>
+    <p1510:client id="{624AE9B3-497A-4442-B20B-018E4EC4C93A}" v="3" dt="2022-02-12T19:43:18.012"/>
     <p1510:client id="{6FECF15C-5B2B-4E28-9356-12199560DEA2}" v="17" dt="2022-02-12T14:50:59.077"/>
     <p1510:client id="{84002584-209E-4196-BCB3-421B7A1AD54B}" v="6" dt="2022-02-08T23:36:46.278"/>
-    <p1510:client id="{8C3F04C0-66B6-45CD-BB59-0CB5CFCCBBE7}" v="116" dt="2022-02-12T19:42:17.411"/>
+    <p1510:client id="{8C3F04C0-66B6-45CD-BB59-0CB5CFCCBBE7}" v="128" dt="2022-02-12T19:42:26.130"/>
     <p1510:client id="{920760E6-20A3-4B21-A37D-884F8384E4C8}" v="174" dt="2022-02-12T19:12:52.479"/>
     <p1510:client id="{A0C2144A-8B5E-4597-BA50-F86C81257BD0}" v="9" dt="2022-02-12T14:48:37.058"/>
     <p1510:client id="{A95D89AB-C85C-4748-A00F-24D749FD00DA}" v="33" dt="2022-02-12T17:24:02.302"/>
@@ -748,6 +751,110 @@
     </pc:docChg>
   </pc:docChgLst>
   <pc:docChgLst>
+    <pc:chgData name="Andrei Kuptsov" userId="S::kupt0002@algonquinlive.com::38c7b6b2-466c-47fa-8652-f87e7fb8beeb" providerId="AD" clId="Web-{8C3F04C0-66B6-45CD-BB59-0CB5CFCCBBE7}"/>
+    <pc:docChg chg="modSld">
+      <pc:chgData name="Andrei Kuptsov" userId="S::kupt0002@algonquinlive.com::38c7b6b2-466c-47fa-8652-f87e7fb8beeb" providerId="AD" clId="Web-{8C3F04C0-66B6-45CD-BB59-0CB5CFCCBBE7}" dt="2022-02-12T19:42:26.083" v="70" actId="20577"/>
+      <pc:docMkLst>
+        <pc:docMk/>
+      </pc:docMkLst>
+      <pc:sldChg chg="addSp delSp modSp modCm">
+        <pc:chgData name="Andrei Kuptsov" userId="S::kupt0002@algonquinlive.com::38c7b6b2-466c-47fa-8652-f87e7fb8beeb" providerId="AD" clId="Web-{8C3F04C0-66B6-45CD-BB59-0CB5CFCCBBE7}" dt="2022-02-12T19:42:26.083" v="70" actId="20577"/>
+        <pc:sldMkLst>
+          <pc:docMk/>
+          <pc:sldMk cId="4249800543" sldId="317"/>
+        </pc:sldMkLst>
+        <pc:spChg chg="add mod">
+          <ac:chgData name="Andrei Kuptsov" userId="S::kupt0002@algonquinlive.com::38c7b6b2-466c-47fa-8652-f87e7fb8beeb" providerId="AD" clId="Web-{8C3F04C0-66B6-45CD-BB59-0CB5CFCCBBE7}" dt="2022-02-12T19:42:24.302" v="69" actId="20577"/>
+          <ac:spMkLst>
+            <pc:docMk/>
+            <pc:sldMk cId="4249800543" sldId="317"/>
+            <ac:spMk id="2" creationId="{AB779033-2A4E-48DD-A6DF-65FE1A0EA23F}"/>
+          </ac:spMkLst>
+        </pc:spChg>
+        <pc:spChg chg="del">
+          <ac:chgData name="Andrei Kuptsov" userId="S::kupt0002@algonquinlive.com::38c7b6b2-466c-47fa-8652-f87e7fb8beeb" providerId="AD" clId="Web-{8C3F04C0-66B6-45CD-BB59-0CB5CFCCBBE7}" dt="2022-02-12T19:40:06.941" v="53"/>
+          <ac:spMkLst>
+            <pc:docMk/>
+            <pc:sldMk cId="4249800543" sldId="317"/>
+            <ac:spMk id="5" creationId="{CF3998FB-F18E-498F-96B2-6688AC231B56}"/>
+          </ac:spMkLst>
+        </pc:spChg>
+        <pc:spChg chg="add mod">
+          <ac:chgData name="Andrei Kuptsov" userId="S::kupt0002@algonquinlive.com::38c7b6b2-466c-47fa-8652-f87e7fb8beeb" providerId="AD" clId="Web-{8C3F04C0-66B6-45CD-BB59-0CB5CFCCBBE7}" dt="2022-02-12T19:42:20.817" v="68" actId="20577"/>
+          <ac:spMkLst>
+            <pc:docMk/>
+            <pc:sldMk cId="4249800543" sldId="317"/>
+            <ac:spMk id="21" creationId="{14A941D7-D989-4501-A9AA-4A9372743BB8}"/>
+          </ac:spMkLst>
+        </pc:spChg>
+        <pc:spChg chg="add mod">
+          <ac:chgData name="Andrei Kuptsov" userId="S::kupt0002@algonquinlive.com::38c7b6b2-466c-47fa-8652-f87e7fb8beeb" providerId="AD" clId="Web-{8C3F04C0-66B6-45CD-BB59-0CB5CFCCBBE7}" dt="2022-02-12T19:42:15.614" v="66" actId="20577"/>
+          <ac:spMkLst>
+            <pc:docMk/>
+            <pc:sldMk cId="4249800543" sldId="317"/>
+            <ac:spMk id="29" creationId="{1091D32F-7FA1-4F9B-B784-626CE2BCED7B}"/>
+          </ac:spMkLst>
+        </pc:spChg>
+        <pc:spChg chg="add mod">
+          <ac:chgData name="Andrei Kuptsov" userId="S::kupt0002@algonquinlive.com::38c7b6b2-466c-47fa-8652-f87e7fb8beeb" providerId="AD" clId="Web-{8C3F04C0-66B6-45CD-BB59-0CB5CFCCBBE7}" dt="2022-02-12T19:42:26.083" v="70" actId="20577"/>
+          <ac:spMkLst>
+            <pc:docMk/>
+            <pc:sldMk cId="4249800543" sldId="317"/>
+            <ac:spMk id="30" creationId="{B569E440-7CE8-477B-B95D-7D83A5DAAEB3}"/>
+          </ac:spMkLst>
+        </pc:spChg>
+        <pc:spChg chg="add mod">
+          <ac:chgData name="Andrei Kuptsov" userId="S::kupt0002@algonquinlive.com::38c7b6b2-466c-47fa-8652-f87e7fb8beeb" providerId="AD" clId="Web-{8C3F04C0-66B6-45CD-BB59-0CB5CFCCBBE7}" dt="2022-02-12T19:42:12.583" v="65" actId="20577"/>
+          <ac:spMkLst>
+            <pc:docMk/>
+            <pc:sldMk cId="4249800543" sldId="317"/>
+            <ac:spMk id="31" creationId="{860B0B3A-422A-41C1-9B52-8E8B180F42A1}"/>
+          </ac:spMkLst>
+        </pc:spChg>
+        <pc:spChg chg="add mod">
+          <ac:chgData name="Andrei Kuptsov" userId="S::kupt0002@algonquinlive.com::38c7b6b2-466c-47fa-8652-f87e7fb8beeb" providerId="AD" clId="Web-{8C3F04C0-66B6-45CD-BB59-0CB5CFCCBBE7}" dt="2022-02-12T19:42:19.099" v="67" actId="20577"/>
+          <ac:spMkLst>
+            <pc:docMk/>
+            <pc:sldMk cId="4249800543" sldId="317"/>
+            <ac:spMk id="32" creationId="{C9694DD5-7E1F-449A-8F67-C3430DCCEF26}"/>
+          </ac:spMkLst>
+        </pc:spChg>
+        <pc:picChg chg="del">
+          <ac:chgData name="Andrei Kuptsov" userId="S::kupt0002@algonquinlive.com::38c7b6b2-466c-47fa-8652-f87e7fb8beeb" providerId="AD" clId="Web-{8C3F04C0-66B6-45CD-BB59-0CB5CFCCBBE7}" dt="2022-02-12T19:40:04.676" v="52"/>
+          <ac:picMkLst>
+            <pc:docMk/>
+            <pc:sldMk cId="4249800543" sldId="317"/>
+            <ac:picMk id="6" creationId="{DB188CA1-F0A5-4790-AAB5-25CDFE2C1400}"/>
+          </ac:picMkLst>
+        </pc:picChg>
+        <pc:picChg chg="mod">
+          <ac:chgData name="Andrei Kuptsov" userId="S::kupt0002@algonquinlive.com::38c7b6b2-466c-47fa-8652-f87e7fb8beeb" providerId="AD" clId="Web-{8C3F04C0-66B6-45CD-BB59-0CB5CFCCBBE7}" dt="2022-02-12T19:38:42.660" v="35" actId="1076"/>
+          <ac:picMkLst>
+            <pc:docMk/>
+            <pc:sldMk cId="4249800543" sldId="317"/>
+            <ac:picMk id="14" creationId="{2441F2AB-796A-49E7-B231-B4EB86E8FD6D}"/>
+          </ac:picMkLst>
+        </pc:picChg>
+        <pc:picChg chg="mod">
+          <ac:chgData name="Andrei Kuptsov" userId="S::kupt0002@algonquinlive.com::38c7b6b2-466c-47fa-8652-f87e7fb8beeb" providerId="AD" clId="Web-{8C3F04C0-66B6-45CD-BB59-0CB5CFCCBBE7}" dt="2022-02-12T19:38:55.582" v="38" actId="1076"/>
+          <ac:picMkLst>
+            <pc:docMk/>
+            <pc:sldMk cId="4249800543" sldId="317"/>
+            <ac:picMk id="16" creationId="{6A36F21F-2AD2-49E9-867C-393F956A3921}"/>
+          </ac:picMkLst>
+        </pc:picChg>
+        <pc:picChg chg="mod">
+          <ac:chgData name="Andrei Kuptsov" userId="S::kupt0002@algonquinlive.com::38c7b6b2-466c-47fa-8652-f87e7fb8beeb" providerId="AD" clId="Web-{8C3F04C0-66B6-45CD-BB59-0CB5CFCCBBE7}" dt="2022-02-12T19:38:45.035" v="36" actId="1076"/>
+          <ac:picMkLst>
+            <pc:docMk/>
+            <pc:sldMk cId="4249800543" sldId="317"/>
+            <ac:picMk id="18" creationId="{B01666DE-B1A3-4B6E-895C-01A74085FAF9}"/>
+          </ac:picMkLst>
+        </pc:picChg>
+      </pc:sldChg>
+    </pc:docChg>
+  </pc:docChgLst>
+  <pc:docChgLst>
     <pc:chgData name="Edward Prado" userId="S::prad0020@algonquinlive.com::0b8cdff3-99fb-4107-b867-033c2140e8ae" providerId="AD" clId="Web-{ADAC236C-D624-49D5-B48F-234E82C01E39}"/>
     <pc:docChg chg="delSld modSld">
       <pc:chgData name="Edward Prado" userId="S::prad0020@algonquinlive.com::0b8cdff3-99fb-4107-b867-033c2140e8ae" providerId="AD" clId="Web-{ADAC236C-D624-49D5-B48F-234E82C01E39}" dt="2022-02-09T18:41:23.289" v="130" actId="20577"/>
@@ -820,110 +927,6 @@
             <ac:spMk id="111" creationId="{00000000-0000-0000-0000-000000000000}"/>
           </ac:spMkLst>
         </pc:spChg>
-      </pc:sldChg>
-    </pc:docChg>
-  </pc:docChgLst>
-  <pc:docChgLst>
-    <pc:chgData name="Andrei Kuptsov" userId="S::kupt0002@algonquinlive.com::38c7b6b2-466c-47fa-8652-f87e7fb8beeb" providerId="AD" clId="Web-{8C3F04C0-66B6-45CD-BB59-0CB5CFCCBBE7}"/>
-    <pc:docChg chg="modSld">
-      <pc:chgData name="Andrei Kuptsov" userId="S::kupt0002@algonquinlive.com::38c7b6b2-466c-47fa-8652-f87e7fb8beeb" providerId="AD" clId="Web-{8C3F04C0-66B6-45CD-BB59-0CB5CFCCBBE7}" dt="2022-02-12T19:42:15.614" v="66" actId="20577"/>
-      <pc:docMkLst>
-        <pc:docMk/>
-      </pc:docMkLst>
-      <pc:sldChg chg="addSp delSp modSp modCm">
-        <pc:chgData name="Andrei Kuptsov" userId="S::kupt0002@algonquinlive.com::38c7b6b2-466c-47fa-8652-f87e7fb8beeb" providerId="AD" clId="Web-{8C3F04C0-66B6-45CD-BB59-0CB5CFCCBBE7}" dt="2022-02-12T19:42:15.614" v="66" actId="20577"/>
-        <pc:sldMkLst>
-          <pc:docMk/>
-          <pc:sldMk cId="4249800543" sldId="317"/>
-        </pc:sldMkLst>
-        <pc:spChg chg="add mod">
-          <ac:chgData name="Andrei Kuptsov" userId="S::kupt0002@algonquinlive.com::38c7b6b2-466c-47fa-8652-f87e7fb8beeb" providerId="AD" clId="Web-{8C3F04C0-66B6-45CD-BB59-0CB5CFCCBBE7}" dt="2022-02-12T19:41:15.004" v="58" actId="20577"/>
-          <ac:spMkLst>
-            <pc:docMk/>
-            <pc:sldMk cId="4249800543" sldId="317"/>
-            <ac:spMk id="2" creationId="{AB779033-2A4E-48DD-A6DF-65FE1A0EA23F}"/>
-          </ac:spMkLst>
-        </pc:spChg>
-        <pc:spChg chg="del">
-          <ac:chgData name="Andrei Kuptsov" userId="S::kupt0002@algonquinlive.com::38c7b6b2-466c-47fa-8652-f87e7fb8beeb" providerId="AD" clId="Web-{8C3F04C0-66B6-45CD-BB59-0CB5CFCCBBE7}" dt="2022-02-12T19:40:06.941" v="53"/>
-          <ac:spMkLst>
-            <pc:docMk/>
-            <pc:sldMk cId="4249800543" sldId="317"/>
-            <ac:spMk id="5" creationId="{CF3998FB-F18E-498F-96B2-6688AC231B56}"/>
-          </ac:spMkLst>
-        </pc:spChg>
-        <pc:spChg chg="add mod">
-          <ac:chgData name="Andrei Kuptsov" userId="S::kupt0002@algonquinlive.com::38c7b6b2-466c-47fa-8652-f87e7fb8beeb" providerId="AD" clId="Web-{8C3F04C0-66B6-45CD-BB59-0CB5CFCCBBE7}" dt="2022-02-12T19:41:43.786" v="59" actId="20577"/>
-          <ac:spMkLst>
-            <pc:docMk/>
-            <pc:sldMk cId="4249800543" sldId="317"/>
-            <ac:spMk id="21" creationId="{14A941D7-D989-4501-A9AA-4A9372743BB8}"/>
-          </ac:spMkLst>
-        </pc:spChg>
-        <pc:spChg chg="add mod">
-          <ac:chgData name="Andrei Kuptsov" userId="S::kupt0002@algonquinlive.com::38c7b6b2-466c-47fa-8652-f87e7fb8beeb" providerId="AD" clId="Web-{8C3F04C0-66B6-45CD-BB59-0CB5CFCCBBE7}" dt="2022-02-12T19:42:15.614" v="66" actId="20577"/>
-          <ac:spMkLst>
-            <pc:docMk/>
-            <pc:sldMk cId="4249800543" sldId="317"/>
-            <ac:spMk id="29" creationId="{1091D32F-7FA1-4F9B-B784-626CE2BCED7B}"/>
-          </ac:spMkLst>
-        </pc:spChg>
-        <pc:spChg chg="add mod">
-          <ac:chgData name="Andrei Kuptsov" userId="S::kupt0002@algonquinlive.com::38c7b6b2-466c-47fa-8652-f87e7fb8beeb" providerId="AD" clId="Web-{8C3F04C0-66B6-45CD-BB59-0CB5CFCCBBE7}" dt="2022-02-12T19:42:02.458" v="62" actId="20577"/>
-          <ac:spMkLst>
-            <pc:docMk/>
-            <pc:sldMk cId="4249800543" sldId="317"/>
-            <ac:spMk id="30" creationId="{B569E440-7CE8-477B-B95D-7D83A5DAAEB3}"/>
-          </ac:spMkLst>
-        </pc:spChg>
-        <pc:spChg chg="add mod">
-          <ac:chgData name="Andrei Kuptsov" userId="S::kupt0002@algonquinlive.com::38c7b6b2-466c-47fa-8652-f87e7fb8beeb" providerId="AD" clId="Web-{8C3F04C0-66B6-45CD-BB59-0CB5CFCCBBE7}" dt="2022-02-12T19:42:12.583" v="65" actId="20577"/>
-          <ac:spMkLst>
-            <pc:docMk/>
-            <pc:sldMk cId="4249800543" sldId="317"/>
-            <ac:spMk id="31" creationId="{860B0B3A-422A-41C1-9B52-8E8B180F42A1}"/>
-          </ac:spMkLst>
-        </pc:spChg>
-        <pc:spChg chg="add mod">
-          <ac:chgData name="Andrei Kuptsov" userId="S::kupt0002@algonquinlive.com::38c7b6b2-466c-47fa-8652-f87e7fb8beeb" providerId="AD" clId="Web-{8C3F04C0-66B6-45CD-BB59-0CB5CFCCBBE7}" dt="2022-02-12T19:41:58.505" v="61" actId="20577"/>
-          <ac:spMkLst>
-            <pc:docMk/>
-            <pc:sldMk cId="4249800543" sldId="317"/>
-            <ac:spMk id="32" creationId="{C9694DD5-7E1F-449A-8F67-C3430DCCEF26}"/>
-          </ac:spMkLst>
-        </pc:spChg>
-        <pc:picChg chg="del">
-          <ac:chgData name="Andrei Kuptsov" userId="S::kupt0002@algonquinlive.com::38c7b6b2-466c-47fa-8652-f87e7fb8beeb" providerId="AD" clId="Web-{8C3F04C0-66B6-45CD-BB59-0CB5CFCCBBE7}" dt="2022-02-12T19:40:04.676" v="52"/>
-          <ac:picMkLst>
-            <pc:docMk/>
-            <pc:sldMk cId="4249800543" sldId="317"/>
-            <ac:picMk id="6" creationId="{DB188CA1-F0A5-4790-AAB5-25CDFE2C1400}"/>
-          </ac:picMkLst>
-        </pc:picChg>
-        <pc:picChg chg="mod">
-          <ac:chgData name="Andrei Kuptsov" userId="S::kupt0002@algonquinlive.com::38c7b6b2-466c-47fa-8652-f87e7fb8beeb" providerId="AD" clId="Web-{8C3F04C0-66B6-45CD-BB59-0CB5CFCCBBE7}" dt="2022-02-12T19:38:42.660" v="35" actId="1076"/>
-          <ac:picMkLst>
-            <pc:docMk/>
-            <pc:sldMk cId="4249800543" sldId="317"/>
-            <ac:picMk id="14" creationId="{2441F2AB-796A-49E7-B231-B4EB86E8FD6D}"/>
-          </ac:picMkLst>
-        </pc:picChg>
-        <pc:picChg chg="mod">
-          <ac:chgData name="Andrei Kuptsov" userId="S::kupt0002@algonquinlive.com::38c7b6b2-466c-47fa-8652-f87e7fb8beeb" providerId="AD" clId="Web-{8C3F04C0-66B6-45CD-BB59-0CB5CFCCBBE7}" dt="2022-02-12T19:38:55.582" v="38" actId="1076"/>
-          <ac:picMkLst>
-            <pc:docMk/>
-            <pc:sldMk cId="4249800543" sldId="317"/>
-            <ac:picMk id="16" creationId="{6A36F21F-2AD2-49E9-867C-393F956A3921}"/>
-          </ac:picMkLst>
-        </pc:picChg>
-        <pc:picChg chg="mod">
-          <ac:chgData name="Andrei Kuptsov" userId="S::kupt0002@algonquinlive.com::38c7b6b2-466c-47fa-8652-f87e7fb8beeb" providerId="AD" clId="Web-{8C3F04C0-66B6-45CD-BB59-0CB5CFCCBBE7}" dt="2022-02-12T19:38:45.035" v="36" actId="1076"/>
-          <ac:picMkLst>
-            <pc:docMk/>
-            <pc:sldMk cId="4249800543" sldId="317"/>
-            <ac:picMk id="18" creationId="{B01666DE-B1A3-4B6E-895C-01A74085FAF9}"/>
-          </ac:picMkLst>
-        </pc:picChg>
       </pc:sldChg>
     </pc:docChg>
   </pc:docChgLst>
@@ -1018,6 +1021,68 @@
             <pc:docMk/>
             <pc:sldMk cId="3358394599" sldId="305"/>
             <ac:spMk id="111" creationId="{00000000-0000-0000-0000-000000000000}"/>
+          </ac:spMkLst>
+        </pc:spChg>
+      </pc:sldChg>
+    </pc:docChg>
+  </pc:docChgLst>
+  <pc:docChgLst>
+    <pc:chgData name="Edward Prado" userId="S::prad0020@algonquinlive.com::0b8cdff3-99fb-4107-b867-033c2140e8ae" providerId="AD" clId="Web-{4E4DB25D-C161-446B-B49C-F5AC1F1B7C68}"/>
+    <pc:docChg chg="addSld modSld sldOrd">
+      <pc:chgData name="Edward Prado" userId="S::prad0020@algonquinlive.com::0b8cdff3-99fb-4107-b867-033c2140e8ae" providerId="AD" clId="Web-{4E4DB25D-C161-446B-B49C-F5AC1F1B7C68}" dt="2022-02-12T19:52:06.039" v="57" actId="20577"/>
+      <pc:docMkLst>
+        <pc:docMk/>
+      </pc:docMkLst>
+      <pc:sldChg chg="addSp modSp">
+        <pc:chgData name="Edward Prado" userId="S::prad0020@algonquinlive.com::0b8cdff3-99fb-4107-b867-033c2140e8ae" providerId="AD" clId="Web-{4E4DB25D-C161-446B-B49C-F5AC1F1B7C68}" dt="2022-02-12T19:52:06.039" v="57" actId="20577"/>
+        <pc:sldMkLst>
+          <pc:docMk/>
+          <pc:sldMk cId="0" sldId="280"/>
+        </pc:sldMkLst>
+        <pc:spChg chg="add mod">
+          <ac:chgData name="Edward Prado" userId="S::prad0020@algonquinlive.com::0b8cdff3-99fb-4107-b867-033c2140e8ae" providerId="AD" clId="Web-{4E4DB25D-C161-446B-B49C-F5AC1F1B7C68}" dt="2022-02-12T19:52:06.039" v="57" actId="20577"/>
+          <ac:spMkLst>
+            <pc:docMk/>
+            <pc:sldMk cId="0" sldId="280"/>
+            <ac:spMk id="2" creationId="{305FEF81-9200-41CA-9D41-7C3615D697B6}"/>
+          </ac:spMkLst>
+        </pc:spChg>
+      </pc:sldChg>
+      <pc:sldChg chg="ord">
+        <pc:chgData name="Edward Prado" userId="S::prad0020@algonquinlive.com::0b8cdff3-99fb-4107-b867-033c2140e8ae" providerId="AD" clId="Web-{4E4DB25D-C161-446B-B49C-F5AC1F1B7C68}" dt="2022-02-12T19:50:39.475" v="13"/>
+        <pc:sldMkLst>
+          <pc:docMk/>
+          <pc:sldMk cId="3154950531" sldId="312"/>
+        </pc:sldMkLst>
+      </pc:sldChg>
+      <pc:sldChg chg="delSp modSp add replId">
+        <pc:chgData name="Edward Prado" userId="S::prad0020@algonquinlive.com::0b8cdff3-99fb-4107-b867-033c2140e8ae" providerId="AD" clId="Web-{4E4DB25D-C161-446B-B49C-F5AC1F1B7C68}" dt="2022-02-12T19:51:16.851" v="27" actId="20577"/>
+        <pc:sldMkLst>
+          <pc:docMk/>
+          <pc:sldMk cId="2995594748" sldId="327"/>
+        </pc:sldMkLst>
+        <pc:spChg chg="mod">
+          <ac:chgData name="Edward Prado" userId="S::prad0020@algonquinlive.com::0b8cdff3-99fb-4107-b867-033c2140e8ae" providerId="AD" clId="Web-{4E4DB25D-C161-446B-B49C-F5AC1F1B7C68}" dt="2022-02-12T19:51:16.851" v="27" actId="20577"/>
+          <ac:spMkLst>
+            <pc:docMk/>
+            <pc:sldMk cId="2995594748" sldId="327"/>
+            <ac:spMk id="85" creationId="{00000000-0000-0000-0000-000000000000}"/>
+          </ac:spMkLst>
+        </pc:spChg>
+        <pc:spChg chg="del">
+          <ac:chgData name="Edward Prado" userId="S::prad0020@algonquinlive.com::0b8cdff3-99fb-4107-b867-033c2140e8ae" providerId="AD" clId="Web-{4E4DB25D-C161-446B-B49C-F5AC1F1B7C68}" dt="2022-02-12T19:49:38.771" v="11"/>
+          <ac:spMkLst>
+            <pc:docMk/>
+            <pc:sldMk cId="2995594748" sldId="327"/>
+            <ac:spMk id="86" creationId="{00000000-0000-0000-0000-000000000000}"/>
+          </ac:spMkLst>
+        </pc:spChg>
+        <pc:spChg chg="mod">
+          <ac:chgData name="Edward Prado" userId="S::prad0020@algonquinlive.com::0b8cdff3-99fb-4107-b867-033c2140e8ae" providerId="AD" clId="Web-{4E4DB25D-C161-446B-B49C-F5AC1F1B7C68}" dt="2022-02-12T19:49:46.209" v="12" actId="1076"/>
+          <ac:spMkLst>
+            <pc:docMk/>
+            <pc:sldMk cId="2995594748" sldId="327"/>
+            <ac:spMk id="87" creationId="{00000000-0000-0000-0000-000000000000}"/>
           </ac:spMkLst>
         </pc:spChg>
       </pc:sldChg>
@@ -2392,6 +2457,30 @@
     </pc:docChg>
   </pc:docChgLst>
   <pc:docChgLst>
+    <pc:chgData name="Seyfullah Burul" userId="S::buru0003@algonquinlive.com::512b66c9-ef71-4b41-be14-9033a3346cb5" providerId="AD" clId="Web-{624AE9B3-497A-4442-B20B-018E4EC4C93A}"/>
+    <pc:docChg chg="modSld">
+      <pc:chgData name="Seyfullah Burul" userId="S::buru0003@algonquinlive.com::512b66c9-ef71-4b41-be14-9033a3346cb5" providerId="AD" clId="Web-{624AE9B3-497A-4442-B20B-018E4EC4C93A}" dt="2022-02-12T19:43:17.950" v="1" actId="20577"/>
+      <pc:docMkLst>
+        <pc:docMk/>
+      </pc:docMkLst>
+      <pc:sldChg chg="modSp">
+        <pc:chgData name="Seyfullah Burul" userId="S::buru0003@algonquinlive.com::512b66c9-ef71-4b41-be14-9033a3346cb5" providerId="AD" clId="Web-{624AE9B3-497A-4442-B20B-018E4EC4C93A}" dt="2022-02-12T19:43:17.950" v="1" actId="20577"/>
+        <pc:sldMkLst>
+          <pc:docMk/>
+          <pc:sldMk cId="530711548" sldId="324"/>
+        </pc:sldMkLst>
+        <pc:spChg chg="mod">
+          <ac:chgData name="Seyfullah Burul" userId="S::buru0003@algonquinlive.com::512b66c9-ef71-4b41-be14-9033a3346cb5" providerId="AD" clId="Web-{624AE9B3-497A-4442-B20B-018E4EC4C93A}" dt="2022-02-12T19:43:17.950" v="1" actId="20577"/>
+          <ac:spMkLst>
+            <pc:docMk/>
+            <pc:sldMk cId="530711548" sldId="324"/>
+            <ac:spMk id="290" creationId="{00000000-0000-0000-0000-000000000000}"/>
+          </ac:spMkLst>
+        </pc:spChg>
+      </pc:sldChg>
+    </pc:docChg>
+  </pc:docChgLst>
+  <pc:docChgLst>
     <pc:chgData name="Edward Prado" userId="S::prad0020@algonquinlive.com::0b8cdff3-99fb-4107-b867-033c2140e8ae" providerId="AD" clId="Web-{52616411-F528-42FE-A4E3-1D395244E643}"/>
     <pc:docChg chg="addSld modSld">
       <pc:chgData name="Edward Prado" userId="S::prad0020@algonquinlive.com::0b8cdff3-99fb-4107-b867-033c2140e8ae" providerId="AD" clId="Web-{52616411-F528-42FE-A4E3-1D395244E643}" dt="2022-02-07T01:16:52.320" v="11" actId="1076"/>
@@ -4698,6 +4787,115 @@
 </file>
 
 <file path=ppt/notesSlides/notesSlide24.xml><?xml version="1.0" encoding="utf-8"?>
+<p:notes xmlns:a="http://schemas.openxmlformats.org/drawingml/2006/main" xmlns:r="http://schemas.openxmlformats.org/officeDocument/2006/relationships" xmlns:p="http://schemas.openxmlformats.org/presentationml/2006/main" showMasterSp="0" showMasterPhAnim="0">
+  <p:cSld>
+    <p:spTree>
+      <p:nvGrpSpPr>
+        <p:cNvPr id="1" name="Shape 80"/>
+        <p:cNvGrpSpPr/>
+        <p:nvPr/>
+      </p:nvGrpSpPr>
+      <p:grpSpPr>
+        <a:xfrm>
+          <a:off x="0" y="0"/>
+          <a:ext cx="0" cy="0"/>
+          <a:chOff x="0" y="0"/>
+          <a:chExt cx="0" cy="0"/>
+        </a:xfrm>
+      </p:grpSpPr>
+      <p:sp>
+        <p:nvSpPr>
+          <p:cNvPr id="81" name="Google Shape;81;g35f391192_04:notes"/>
+          <p:cNvSpPr>
+            <a:spLocks noGrp="1" noRot="1" noChangeAspect="1"/>
+          </p:cNvSpPr>
+          <p:nvPr>
+            <p:ph type="sldImg" idx="2"/>
+          </p:nvPr>
+        </p:nvSpPr>
+        <p:spPr>
+          <a:xfrm>
+            <a:off x="381000" y="685800"/>
+            <a:ext cx="6096000" cy="3429000"/>
+          </a:xfrm>
+          <a:custGeom>
+            <a:avLst/>
+            <a:gdLst/>
+            <a:ahLst/>
+            <a:cxnLst/>
+            <a:rect l="l" t="t" r="r" b="b"/>
+            <a:pathLst>
+              <a:path w="120000" h="120000" extrusionOk="0">
+                <a:moveTo>
+                  <a:pt x="0" y="0"/>
+                </a:moveTo>
+                <a:lnTo>
+                  <a:pt x="120000" y="0"/>
+                </a:lnTo>
+                <a:lnTo>
+                  <a:pt x="120000" y="120000"/>
+                </a:lnTo>
+                <a:lnTo>
+                  <a:pt x="0" y="120000"/>
+                </a:lnTo>
+                <a:close/>
+              </a:path>
+            </a:pathLst>
+          </a:custGeom>
+        </p:spPr>
+      </p:sp>
+      <p:sp>
+        <p:nvSpPr>
+          <p:cNvPr id="82" name="Google Shape;82;g35f391192_04:notes"/>
+          <p:cNvSpPr txBox="1">
+            <a:spLocks noGrp="1"/>
+          </p:cNvSpPr>
+          <p:nvPr>
+            <p:ph type="body" idx="1"/>
+          </p:nvPr>
+        </p:nvSpPr>
+        <p:spPr>
+          <a:xfrm>
+            <a:off x="685800" y="4343400"/>
+            <a:ext cx="5486400" cy="4114800"/>
+          </a:xfrm>
+          <a:prstGeom prst="rect">
+            <a:avLst/>
+          </a:prstGeom>
+        </p:spPr>
+        <p:txBody>
+          <a:bodyPr spcFirstLastPara="1" wrap="square" lIns="91425" tIns="91425" rIns="91425" bIns="91425" anchor="t" anchorCtr="0">
+            <a:noAutofit/>
+          </a:bodyPr>
+          <a:lstStyle/>
+          <a:p>
+            <a:pPr marL="0" lvl="0" indent="0" algn="l" rtl="0">
+              <a:spcBef>
+                <a:spcPts val="0"/>
+              </a:spcBef>
+              <a:spcAft>
+                <a:spcPts val="0"/>
+              </a:spcAft>
+              <a:buNone/>
+            </a:pPr>
+            <a:endParaRPr/>
+          </a:p>
+        </p:txBody>
+      </p:sp>
+    </p:spTree>
+    <p:extLst>
+      <p:ext uri="{BB962C8B-B14F-4D97-AF65-F5344CB8AC3E}">
+        <p14:creationId xmlns:p14="http://schemas.microsoft.com/office/powerpoint/2010/main" val="3655182710"/>
+      </p:ext>
+    </p:extLst>
+  </p:cSld>
+  <p:clrMapOvr>
+    <a:masterClrMapping/>
+  </p:clrMapOvr>
+</p:notes>
+</file>
+
+<file path=ppt/notesSlides/notesSlide25.xml><?xml version="1.0" encoding="utf-8"?>
 <p:notes xmlns:a="http://schemas.openxmlformats.org/drawingml/2006/main" xmlns:r="http://schemas.openxmlformats.org/officeDocument/2006/relationships" xmlns:p="http://schemas.openxmlformats.org/presentationml/2006/main" showMasterSp="0" showMasterPhAnim="0">
   <p:cSld>
     <p:spTree>
@@ -13543,6 +13741,302 @@
           </a:p>
         </p:txBody>
       </p:sp>
+      <p:sp>
+        <p:nvSpPr>
+          <p:cNvPr id="2" name="Google Shape;87;p14">
+            <a:extLst>
+              <a:ext uri="{FF2B5EF4-FFF2-40B4-BE49-F238E27FC236}">
+                <a16:creationId xmlns:a16="http://schemas.microsoft.com/office/drawing/2014/main" id="{305FEF81-9200-41CA-9D41-7C3615D697B6}"/>
+              </a:ext>
+            </a:extLst>
+          </p:cNvPr>
+          <p:cNvSpPr txBox="1">
+            <a:spLocks/>
+          </p:cNvSpPr>
+          <p:nvPr/>
+        </p:nvSpPr>
+        <p:spPr>
+          <a:xfrm>
+            <a:off x="685000" y="2406059"/>
+            <a:ext cx="7800337" cy="2461500"/>
+          </a:xfrm>
+          <a:prstGeom prst="rect">
+            <a:avLst/>
+          </a:prstGeom>
+          <a:noFill/>
+          <a:ln>
+            <a:noFill/>
+          </a:ln>
+        </p:spPr>
+        <p:txBody>
+          <a:bodyPr spcFirstLastPara="1" wrap="square" lIns="91425" tIns="91425" rIns="91425" bIns="91425" anchor="t" anchorCtr="0">
+            <a:noAutofit/>
+          </a:bodyPr>
+          <a:lstStyle>
+            <a:defPPr marR="0" lvl="0" algn="l" rtl="0">
+              <a:lnSpc>
+                <a:spcPct val="100000"/>
+              </a:lnSpc>
+              <a:spcBef>
+                <a:spcPts val="0"/>
+              </a:spcBef>
+              <a:spcAft>
+                <a:spcPts val="0"/>
+              </a:spcAft>
+            </a:defPPr>
+            <a:lvl1pPr marL="457200" marR="0" lvl="0" indent="-419100" algn="l" rtl="0">
+              <a:lnSpc>
+                <a:spcPct val="100000"/>
+              </a:lnSpc>
+              <a:spcBef>
+                <a:spcPts val="600"/>
+              </a:spcBef>
+              <a:spcAft>
+                <a:spcPts val="0"/>
+              </a:spcAft>
+              <a:buClr>
+                <a:schemeClr val="accent4"/>
+              </a:buClr>
+              <a:buSzPts val="3000"/>
+              <a:buFont typeface="Source Sans Pro"/>
+              <a:buChar char="◎"/>
+              <a:defRPr sz="3000" b="0" i="0" u="none" strike="noStrike" cap="none">
+                <a:solidFill>
+                  <a:schemeClr val="dk1"/>
+                </a:solidFill>
+                <a:latin typeface="Source Sans Pro"/>
+                <a:ea typeface="Source Sans Pro"/>
+                <a:cs typeface="Source Sans Pro"/>
+                <a:sym typeface="Source Sans Pro"/>
+              </a:defRPr>
+            </a:lvl1pPr>
+            <a:lvl2pPr marL="914400" marR="0" lvl="1" indent="-381000" algn="l" rtl="0">
+              <a:lnSpc>
+                <a:spcPct val="100000"/>
+              </a:lnSpc>
+              <a:spcBef>
+                <a:spcPts val="0"/>
+              </a:spcBef>
+              <a:spcAft>
+                <a:spcPts val="0"/>
+              </a:spcAft>
+              <a:buClr>
+                <a:schemeClr val="accent4"/>
+              </a:buClr>
+              <a:buSzPts val="2400"/>
+              <a:buFont typeface="Source Sans Pro"/>
+              <a:buChar char="○"/>
+              <a:defRPr sz="2400" b="0" i="0" u="none" strike="noStrike" cap="none">
+                <a:solidFill>
+                  <a:schemeClr val="dk1"/>
+                </a:solidFill>
+                <a:latin typeface="Source Sans Pro"/>
+                <a:ea typeface="Source Sans Pro"/>
+                <a:cs typeface="Source Sans Pro"/>
+                <a:sym typeface="Source Sans Pro"/>
+              </a:defRPr>
+            </a:lvl2pPr>
+            <a:lvl3pPr marL="1371600" marR="0" lvl="2" indent="-381000" algn="l" rtl="0">
+              <a:lnSpc>
+                <a:spcPct val="100000"/>
+              </a:lnSpc>
+              <a:spcBef>
+                <a:spcPts val="0"/>
+              </a:spcBef>
+              <a:spcAft>
+                <a:spcPts val="0"/>
+              </a:spcAft>
+              <a:buClr>
+                <a:schemeClr val="accent4"/>
+              </a:buClr>
+              <a:buSzPts val="2400"/>
+              <a:buFont typeface="Source Sans Pro"/>
+              <a:buChar char="◉"/>
+              <a:defRPr sz="2400" b="0" i="0" u="none" strike="noStrike" cap="none">
+                <a:solidFill>
+                  <a:schemeClr val="dk1"/>
+                </a:solidFill>
+                <a:latin typeface="Source Sans Pro"/>
+                <a:ea typeface="Source Sans Pro"/>
+                <a:cs typeface="Source Sans Pro"/>
+                <a:sym typeface="Source Sans Pro"/>
+              </a:defRPr>
+            </a:lvl3pPr>
+            <a:lvl4pPr marL="1828800" marR="0" lvl="3" indent="-342900" algn="l" rtl="0">
+              <a:lnSpc>
+                <a:spcPct val="100000"/>
+              </a:lnSpc>
+              <a:spcBef>
+                <a:spcPts val="0"/>
+              </a:spcBef>
+              <a:spcAft>
+                <a:spcPts val="0"/>
+              </a:spcAft>
+              <a:buClr>
+                <a:schemeClr val="dk1"/>
+              </a:buClr>
+              <a:buSzPts val="1800"/>
+              <a:buFont typeface="Source Sans Pro"/>
+              <a:buChar char="●"/>
+              <a:defRPr sz="1800" b="0" i="0" u="none" strike="noStrike" cap="none">
+                <a:solidFill>
+                  <a:schemeClr val="dk1"/>
+                </a:solidFill>
+                <a:latin typeface="Source Sans Pro"/>
+                <a:ea typeface="Source Sans Pro"/>
+                <a:cs typeface="Source Sans Pro"/>
+                <a:sym typeface="Source Sans Pro"/>
+              </a:defRPr>
+            </a:lvl4pPr>
+            <a:lvl5pPr marL="2286000" marR="0" lvl="4" indent="-342900" algn="l" rtl="0">
+              <a:lnSpc>
+                <a:spcPct val="100000"/>
+              </a:lnSpc>
+              <a:spcBef>
+                <a:spcPts val="0"/>
+              </a:spcBef>
+              <a:spcAft>
+                <a:spcPts val="0"/>
+              </a:spcAft>
+              <a:buClr>
+                <a:schemeClr val="dk1"/>
+              </a:buClr>
+              <a:buSzPts val="1800"/>
+              <a:buFont typeface="Source Sans Pro"/>
+              <a:buChar char="○"/>
+              <a:defRPr sz="1800" b="0" i="0" u="none" strike="noStrike" cap="none">
+                <a:solidFill>
+                  <a:schemeClr val="dk1"/>
+                </a:solidFill>
+                <a:latin typeface="Source Sans Pro"/>
+                <a:ea typeface="Source Sans Pro"/>
+                <a:cs typeface="Source Sans Pro"/>
+                <a:sym typeface="Source Sans Pro"/>
+              </a:defRPr>
+            </a:lvl5pPr>
+            <a:lvl6pPr marL="2743200" marR="0" lvl="5" indent="-342900" algn="l" rtl="0">
+              <a:lnSpc>
+                <a:spcPct val="100000"/>
+              </a:lnSpc>
+              <a:spcBef>
+                <a:spcPts val="0"/>
+              </a:spcBef>
+              <a:spcAft>
+                <a:spcPts val="0"/>
+              </a:spcAft>
+              <a:buClr>
+                <a:schemeClr val="dk1"/>
+              </a:buClr>
+              <a:buSzPts val="1800"/>
+              <a:buFont typeface="Source Sans Pro"/>
+              <a:buChar char="■"/>
+              <a:defRPr sz="1800" b="0" i="0" u="none" strike="noStrike" cap="none">
+                <a:solidFill>
+                  <a:schemeClr val="dk1"/>
+                </a:solidFill>
+                <a:latin typeface="Source Sans Pro"/>
+                <a:ea typeface="Source Sans Pro"/>
+                <a:cs typeface="Source Sans Pro"/>
+                <a:sym typeface="Source Sans Pro"/>
+              </a:defRPr>
+            </a:lvl6pPr>
+            <a:lvl7pPr marL="3200400" marR="0" lvl="6" indent="-342900" algn="l" rtl="0">
+              <a:lnSpc>
+                <a:spcPct val="100000"/>
+              </a:lnSpc>
+              <a:spcBef>
+                <a:spcPts val="0"/>
+              </a:spcBef>
+              <a:spcAft>
+                <a:spcPts val="0"/>
+              </a:spcAft>
+              <a:buClr>
+                <a:schemeClr val="dk1"/>
+              </a:buClr>
+              <a:buSzPts val="1800"/>
+              <a:buFont typeface="Source Sans Pro"/>
+              <a:buChar char="●"/>
+              <a:defRPr sz="1800" b="0" i="0" u="none" strike="noStrike" cap="none">
+                <a:solidFill>
+                  <a:schemeClr val="dk1"/>
+                </a:solidFill>
+                <a:latin typeface="Source Sans Pro"/>
+                <a:ea typeface="Source Sans Pro"/>
+                <a:cs typeface="Source Sans Pro"/>
+                <a:sym typeface="Source Sans Pro"/>
+              </a:defRPr>
+            </a:lvl7pPr>
+            <a:lvl8pPr marL="3657600" marR="0" lvl="7" indent="-342900" algn="l" rtl="0">
+              <a:lnSpc>
+                <a:spcPct val="100000"/>
+              </a:lnSpc>
+              <a:spcBef>
+                <a:spcPts val="0"/>
+              </a:spcBef>
+              <a:spcAft>
+                <a:spcPts val="0"/>
+              </a:spcAft>
+              <a:buClr>
+                <a:schemeClr val="dk1"/>
+              </a:buClr>
+              <a:buSzPts val="1800"/>
+              <a:buFont typeface="Source Sans Pro"/>
+              <a:buChar char="○"/>
+              <a:defRPr sz="1800" b="0" i="0" u="none" strike="noStrike" cap="none">
+                <a:solidFill>
+                  <a:schemeClr val="dk1"/>
+                </a:solidFill>
+                <a:latin typeface="Source Sans Pro"/>
+                <a:ea typeface="Source Sans Pro"/>
+                <a:cs typeface="Source Sans Pro"/>
+                <a:sym typeface="Source Sans Pro"/>
+              </a:defRPr>
+            </a:lvl8pPr>
+            <a:lvl9pPr marL="4114800" marR="0" lvl="8" indent="-342900" algn="l" rtl="0">
+              <a:lnSpc>
+                <a:spcPct val="100000"/>
+              </a:lnSpc>
+              <a:spcBef>
+                <a:spcPts val="0"/>
+              </a:spcBef>
+              <a:spcAft>
+                <a:spcPts val="0"/>
+              </a:spcAft>
+              <a:buClr>
+                <a:schemeClr val="dk1"/>
+              </a:buClr>
+              <a:buSzPts val="1800"/>
+              <a:buFont typeface="Source Sans Pro"/>
+              <a:buChar char="■"/>
+              <a:defRPr sz="1800" b="0" i="0" u="none" strike="noStrike" cap="none">
+                <a:solidFill>
+                  <a:schemeClr val="dk1"/>
+                </a:solidFill>
+                <a:latin typeface="Source Sans Pro"/>
+                <a:ea typeface="Source Sans Pro"/>
+                <a:cs typeface="Source Sans Pro"/>
+                <a:sym typeface="Source Sans Pro"/>
+              </a:defRPr>
+            </a:lvl9pPr>
+          </a:lstStyle>
+          <a:p>
+            <a:pPr indent="-457200"/>
+            <a:r>
+              <a:rPr lang="en" sz="2600"/>
+              <a:t>Download the example from our presentation here: </a:t>
+            </a:r>
+          </a:p>
+          <a:p>
+            <a:pPr lvl="1"/>
+            <a:r>
+              <a:rPr lang="en" sz="2000">
+                <a:hlinkClick r:id="rId3"/>
+              </a:rPr>
+              <a:t>https://github.com/EdwardPrado/JestPresentation</a:t>
+            </a:r>
+          </a:p>
+        </p:txBody>
+      </p:sp>
     </p:spTree>
   </p:cSld>
   <p:clrMapOvr>
@@ -14561,6 +15055,261 @@
 </file>
 
 <file path=ppt/slides/slide24.xml><?xml version="1.0" encoding="utf-8"?>
+<p:sld xmlns:a="http://schemas.openxmlformats.org/drawingml/2006/main" xmlns:r="http://schemas.openxmlformats.org/officeDocument/2006/relationships" xmlns:p="http://schemas.openxmlformats.org/presentationml/2006/main">
+  <p:cSld>
+    <p:bg>
+      <p:bgPr>
+        <a:blipFill>
+          <a:blip r:embed="rId3">
+            <a:alphaModFix/>
+          </a:blip>
+          <a:stretch>
+            <a:fillRect/>
+          </a:stretch>
+        </a:blipFill>
+        <a:effectLst/>
+      </p:bgPr>
+    </p:bg>
+    <p:spTree>
+      <p:nvGrpSpPr>
+        <p:cNvPr id="1" name="Shape 83"/>
+        <p:cNvGrpSpPr/>
+        <p:nvPr/>
+      </p:nvGrpSpPr>
+      <p:grpSpPr>
+        <a:xfrm>
+          <a:off x="0" y="0"/>
+          <a:ext cx="0" cy="0"/>
+          <a:chOff x="0" y="0"/>
+          <a:chExt cx="0" cy="0"/>
+        </a:xfrm>
+      </p:grpSpPr>
+      <p:sp>
+        <p:nvSpPr>
+          <p:cNvPr id="84" name="Google Shape;84;p14"/>
+          <p:cNvSpPr/>
+          <p:nvPr/>
+        </p:nvSpPr>
+        <p:spPr>
+          <a:xfrm>
+            <a:off x="5880381" y="2562025"/>
+            <a:ext cx="1381800" cy="1365600"/>
+          </a:xfrm>
+          <a:prstGeom prst="ellipse">
+            <a:avLst/>
+          </a:prstGeom>
+          <a:noFill/>
+          <a:ln w="9525" cap="flat" cmpd="sng">
+            <a:solidFill>
+              <a:srgbClr val="CFD8DC"/>
+            </a:solidFill>
+            <a:prstDash val="dash"/>
+            <a:round/>
+            <a:headEnd type="none" w="sm" len="sm"/>
+            <a:tailEnd type="none" w="sm" len="sm"/>
+          </a:ln>
+        </p:spPr>
+        <p:txBody>
+          <a:bodyPr spcFirstLastPara="1" wrap="square" lIns="91425" tIns="91425" rIns="91425" bIns="91425" anchor="ctr" anchorCtr="0">
+            <a:noAutofit/>
+          </a:bodyPr>
+          <a:lstStyle/>
+          <a:p>
+            <a:pPr marL="0" lvl="0" indent="0" algn="l" rtl="0">
+              <a:spcBef>
+                <a:spcPts val="0"/>
+              </a:spcBef>
+              <a:spcAft>
+                <a:spcPts val="0"/>
+              </a:spcAft>
+              <a:buNone/>
+            </a:pPr>
+            <a:endParaRPr/>
+          </a:p>
+        </p:txBody>
+      </p:sp>
+      <p:sp>
+        <p:nvSpPr>
+          <p:cNvPr id="85" name="Google Shape;85;p14"/>
+          <p:cNvSpPr txBox="1">
+            <a:spLocks noGrp="1"/>
+          </p:cNvSpPr>
+          <p:nvPr>
+            <p:ph type="ctrTitle" idx="4294967295"/>
+          </p:nvPr>
+        </p:nvSpPr>
+        <p:spPr>
+          <a:xfrm>
+            <a:off x="1637500" y="592744"/>
+            <a:ext cx="5642100" cy="1159800"/>
+          </a:xfrm>
+          <a:prstGeom prst="rect">
+            <a:avLst/>
+          </a:prstGeom>
+        </p:spPr>
+        <p:txBody>
+          <a:bodyPr spcFirstLastPara="1" wrap="square" lIns="91425" tIns="91425" rIns="91425" bIns="91425" anchor="b" anchorCtr="0">
+            <a:noAutofit/>
+          </a:bodyPr>
+          <a:lstStyle/>
+          <a:p>
+            <a:r>
+              <a:rPr lang="en" sz="6000" b="1"/>
+              <a:t>Group 7</a:t>
+            </a:r>
+          </a:p>
+        </p:txBody>
+      </p:sp>
+      <p:sp>
+        <p:nvSpPr>
+          <p:cNvPr id="87" name="Google Shape;87;p14"/>
+          <p:cNvSpPr txBox="1">
+            <a:spLocks noGrp="1"/>
+          </p:cNvSpPr>
+          <p:nvPr>
+            <p:ph type="body" idx="4294967295"/>
+          </p:nvPr>
+        </p:nvSpPr>
+        <p:spPr>
+          <a:xfrm>
+            <a:off x="1637500" y="1703591"/>
+            <a:ext cx="4109400" cy="2461500"/>
+          </a:xfrm>
+          <a:prstGeom prst="rect">
+            <a:avLst/>
+          </a:prstGeom>
+        </p:spPr>
+        <p:txBody>
+          <a:bodyPr spcFirstLastPara="1" wrap="square" lIns="91425" tIns="91425" rIns="91425" bIns="91425" anchor="t" anchorCtr="0">
+            <a:noAutofit/>
+          </a:bodyPr>
+          <a:lstStyle/>
+          <a:p>
+            <a:pPr indent="-457200"/>
+            <a:r>
+              <a:rPr lang="en" sz="2600"/>
+              <a:t>Waseem </a:t>
+            </a:r>
+            <a:r>
+              <a:rPr lang="en" sz="2600" err="1"/>
+              <a:t>Chamaa</a:t>
+            </a:r>
+          </a:p>
+          <a:p>
+            <a:pPr indent="-457200"/>
+            <a:r>
+              <a:rPr lang="en" sz="2600"/>
+              <a:t>Seyfullah Burul</a:t>
+            </a:r>
+          </a:p>
+          <a:p>
+            <a:pPr indent="-457200"/>
+            <a:r>
+              <a:rPr lang="en" sz="2600"/>
+              <a:t>Andrei Kuptsov</a:t>
+            </a:r>
+          </a:p>
+          <a:p>
+            <a:pPr indent="-457200"/>
+            <a:r>
+              <a:rPr lang="en" sz="2600"/>
+              <a:t>Edward Prado</a:t>
+            </a:r>
+          </a:p>
+        </p:txBody>
+      </p:sp>
+      <p:cxnSp>
+        <p:nvCxnSpPr>
+          <p:cNvPr id="89" name="Google Shape;89;p14"/>
+          <p:cNvCxnSpPr/>
+          <p:nvPr/>
+        </p:nvCxnSpPr>
+        <p:spPr>
+          <a:xfrm>
+            <a:off x="6694986" y="3933625"/>
+            <a:ext cx="214500" cy="856800"/>
+          </a:xfrm>
+          <a:prstGeom prst="straightConnector1">
+            <a:avLst/>
+          </a:prstGeom>
+          <a:noFill/>
+          <a:ln w="9525" cap="flat" cmpd="sng">
+            <a:solidFill>
+              <a:srgbClr val="CFD8DC"/>
+            </a:solidFill>
+            <a:prstDash val="solid"/>
+            <a:round/>
+            <a:headEnd type="none" w="med" len="med"/>
+            <a:tailEnd type="none" w="med" len="med"/>
+          </a:ln>
+        </p:spPr>
+      </p:cxnSp>
+      <p:cxnSp>
+        <p:nvCxnSpPr>
+          <p:cNvPr id="90" name="Google Shape;90;p14"/>
+          <p:cNvCxnSpPr/>
+          <p:nvPr/>
+        </p:nvCxnSpPr>
+        <p:spPr>
+          <a:xfrm>
+            <a:off x="7059842" y="3727574"/>
+            <a:ext cx="394200" cy="525600"/>
+          </a:xfrm>
+          <a:prstGeom prst="straightConnector1">
+            <a:avLst/>
+          </a:prstGeom>
+          <a:noFill/>
+          <a:ln w="9525" cap="flat" cmpd="sng">
+            <a:solidFill>
+              <a:srgbClr val="CFD8DC"/>
+            </a:solidFill>
+            <a:prstDash val="solid"/>
+            <a:round/>
+            <a:headEnd type="none" w="med" len="med"/>
+            <a:tailEnd type="none" w="med" len="med"/>
+          </a:ln>
+        </p:spPr>
+      </p:cxnSp>
+      <p:cxnSp>
+        <p:nvCxnSpPr>
+          <p:cNvPr id="91" name="Google Shape;91;p14"/>
+          <p:cNvCxnSpPr/>
+          <p:nvPr/>
+        </p:nvCxnSpPr>
+        <p:spPr>
+          <a:xfrm>
+            <a:off x="7224089" y="3501963"/>
+            <a:ext cx="752400" cy="464100"/>
+          </a:xfrm>
+          <a:prstGeom prst="straightConnector1">
+            <a:avLst/>
+          </a:prstGeom>
+          <a:noFill/>
+          <a:ln w="9525" cap="flat" cmpd="sng">
+            <a:solidFill>
+              <a:srgbClr val="CFD8DC"/>
+            </a:solidFill>
+            <a:prstDash val="solid"/>
+            <a:round/>
+            <a:headEnd type="none" w="med" len="med"/>
+            <a:tailEnd type="none" w="med" len="med"/>
+          </a:ln>
+        </p:spPr>
+      </p:cxnSp>
+    </p:spTree>
+    <p:extLst>
+      <p:ext uri="{BB962C8B-B14F-4D97-AF65-F5344CB8AC3E}">
+        <p14:creationId xmlns:p14="http://schemas.microsoft.com/office/powerpoint/2010/main" val="2995594748"/>
+      </p:ext>
+    </p:extLst>
+  </p:cSld>
+  <p:clrMapOvr>
+    <a:masterClrMapping/>
+  </p:clrMapOvr>
+</p:sld>
+</file>
+
+<file path=ppt/slides/slide25.xml><?xml version="1.0" encoding="utf-8"?>
 <p:sld xmlns:a="http://schemas.openxmlformats.org/drawingml/2006/main" xmlns:r="http://schemas.openxmlformats.org/officeDocument/2006/relationships" xmlns:p="http://schemas.openxmlformats.org/presentationml/2006/main">
   <p:cSld>
     <p:spTree>
@@ -19075,10 +19824,7 @@
             <a:r>
               <a:rPr lang="en-US" sz="1800">
                 <a:solidFill>
-                  <a:schemeClr val="accent2">
-                    <a:lumMod val="60000"/>
-                    <a:lumOff val="40000"/>
-                  </a:schemeClr>
+                  <a:schemeClr val="tx1"/>
                 </a:solidFill>
                 <a:latin typeface="Source Sans Pro"/>
               </a:rPr>
@@ -19086,10 +19832,7 @@
             </a:r>
             <a:endParaRPr lang="en-US" sz="1800">
               <a:solidFill>
-                <a:schemeClr val="accent2">
-                  <a:lumMod val="60000"/>
-                  <a:lumOff val="40000"/>
-                </a:schemeClr>
+                <a:schemeClr val="tx1"/>
               </a:solidFill>
             </a:endParaRPr>
           </a:p>
@@ -19129,10 +19872,7 @@
             <a:r>
               <a:rPr lang="en-US" sz="1800">
                 <a:solidFill>
-                  <a:schemeClr val="accent2">
-                    <a:lumMod val="60000"/>
-                    <a:lumOff val="40000"/>
-                  </a:schemeClr>
+                  <a:schemeClr val="tx1"/>
                 </a:solidFill>
                 <a:latin typeface="Source Sans Pro"/>
               </a:rPr>
@@ -19140,10 +19880,7 @@
             </a:r>
             <a:endParaRPr lang="en-US" sz="1800">
               <a:solidFill>
-                <a:schemeClr val="accent2">
-                  <a:lumMod val="60000"/>
-                  <a:lumOff val="40000"/>
-                </a:schemeClr>
+                <a:schemeClr val="tx1"/>
               </a:solidFill>
             </a:endParaRPr>
           </a:p>
@@ -19231,10 +19968,7 @@
             <a:r>
               <a:rPr lang="en-US" sz="1800">
                 <a:solidFill>
-                  <a:schemeClr val="accent2">
-                    <a:lumMod val="60000"/>
-                    <a:lumOff val="40000"/>
-                  </a:schemeClr>
+                  <a:schemeClr val="tx1"/>
                 </a:solidFill>
                 <a:latin typeface="Source Sans Pro"/>
               </a:rPr>
@@ -19242,10 +19976,7 @@
             </a:r>
             <a:endParaRPr lang="en-US" sz="1800">
               <a:solidFill>
-                <a:schemeClr val="accent2">
-                  <a:lumMod val="60000"/>
-                  <a:lumOff val="40000"/>
-                </a:schemeClr>
+                <a:schemeClr val="tx1"/>
               </a:solidFill>
             </a:endParaRPr>
           </a:p>
@@ -19333,10 +20064,7 @@
             <a:r>
               <a:rPr lang="en-US" sz="1800">
                 <a:solidFill>
-                  <a:schemeClr val="accent2">
-                    <a:lumMod val="60000"/>
-                    <a:lumOff val="40000"/>
-                  </a:schemeClr>
+                  <a:schemeClr val="tx1"/>
                 </a:solidFill>
                 <a:latin typeface="Source Sans Pro"/>
               </a:rPr>
@@ -19344,10 +20072,7 @@
             </a:r>
             <a:endParaRPr lang="en-US" sz="1800">
               <a:solidFill>
-                <a:schemeClr val="accent2">
-                  <a:lumMod val="60000"/>
-                  <a:lumOff val="40000"/>
-                </a:schemeClr>
+                <a:schemeClr val="tx1"/>
               </a:solidFill>
             </a:endParaRPr>
           </a:p>
@@ -21304,13 +22029,13 @@
                   <a:srgbClr val="000000"/>
                 </a:solidFill>
                 <a:effectLst/>
-                <a:latin typeface="Calibri" panose="020F0502020204030204" pitchFamily="34" charset="0"/>
+                <a:latin typeface="Calibri"/>
               </a:rPr>
               <a:t>(Command Line Interface)</a:t>
             </a:r>
             <a:r>
               <a:rPr lang="en-US" sz="1200"/>
-              <a:t> tool to manage your testing processes</a:t>
+              <a:t> tool to manage your testing processes.</a:t>
             </a:r>
             <a:endParaRPr sz="1200"/>
           </a:p>

</xml_diff>